<commit_message>
Deployed 41edefa with MkDocs version: 1.6.1
</commit_message>
<xml_diff>
--- a/ArduinoNode.pptx
+++ b/ArduinoNode.pptx
@@ -11,6 +11,7 @@
     <p:sldId id="259" r:id="rId5"/>
     <p:sldId id="260" r:id="rId6"/>
     <p:sldId id="261" r:id="rId7"/>
+    <p:sldId id="262" r:id="rId8"/>
   </p:sldIdLst>
   <p:sldSz cx="12192000" cy="6858000"/>
   <p:notesSz cx="6858000" cy="9144000"/>
@@ -264,7 +265,7 @@
           <a:p>
             <a:fld id="{1B7BBFC1-767F-4370-ABF8-558E432A7908}" type="datetimeFigureOut">
               <a:rPr lang="en-US" smtClean="0"/>
-              <a:t>6/18/2025</a:t>
+              <a:t>6/21/2025</a:t>
             </a:fld>
             <a:endParaRPr lang="en-US"/>
           </a:p>
@@ -462,7 +463,7 @@
           <a:p>
             <a:fld id="{1B7BBFC1-767F-4370-ABF8-558E432A7908}" type="datetimeFigureOut">
               <a:rPr lang="en-US" smtClean="0"/>
-              <a:t>6/18/2025</a:t>
+              <a:t>6/21/2025</a:t>
             </a:fld>
             <a:endParaRPr lang="en-US"/>
           </a:p>
@@ -670,7 +671,7 @@
           <a:p>
             <a:fld id="{1B7BBFC1-767F-4370-ABF8-558E432A7908}" type="datetimeFigureOut">
               <a:rPr lang="en-US" smtClean="0"/>
-              <a:t>6/18/2025</a:t>
+              <a:t>6/21/2025</a:t>
             </a:fld>
             <a:endParaRPr lang="en-US"/>
           </a:p>
@@ -868,7 +869,7 @@
           <a:p>
             <a:fld id="{1B7BBFC1-767F-4370-ABF8-558E432A7908}" type="datetimeFigureOut">
               <a:rPr lang="en-US" smtClean="0"/>
-              <a:t>6/18/2025</a:t>
+              <a:t>6/21/2025</a:t>
             </a:fld>
             <a:endParaRPr lang="en-US"/>
           </a:p>
@@ -1143,7 +1144,7 @@
           <a:p>
             <a:fld id="{1B7BBFC1-767F-4370-ABF8-558E432A7908}" type="datetimeFigureOut">
               <a:rPr lang="en-US" smtClean="0"/>
-              <a:t>6/18/2025</a:t>
+              <a:t>6/21/2025</a:t>
             </a:fld>
             <a:endParaRPr lang="en-US"/>
           </a:p>
@@ -1408,7 +1409,7 @@
           <a:p>
             <a:fld id="{1B7BBFC1-767F-4370-ABF8-558E432A7908}" type="datetimeFigureOut">
               <a:rPr lang="en-US" smtClean="0"/>
-              <a:t>6/18/2025</a:t>
+              <a:t>6/21/2025</a:t>
             </a:fld>
             <a:endParaRPr lang="en-US"/>
           </a:p>
@@ -1820,7 +1821,7 @@
           <a:p>
             <a:fld id="{1B7BBFC1-767F-4370-ABF8-558E432A7908}" type="datetimeFigureOut">
               <a:rPr lang="en-US" smtClean="0"/>
-              <a:t>6/18/2025</a:t>
+              <a:t>6/21/2025</a:t>
             </a:fld>
             <a:endParaRPr lang="en-US"/>
           </a:p>
@@ -1961,7 +1962,7 @@
           <a:p>
             <a:fld id="{1B7BBFC1-767F-4370-ABF8-558E432A7908}" type="datetimeFigureOut">
               <a:rPr lang="en-US" smtClean="0"/>
-              <a:t>6/18/2025</a:t>
+              <a:t>6/21/2025</a:t>
             </a:fld>
             <a:endParaRPr lang="en-US"/>
           </a:p>
@@ -2074,7 +2075,7 @@
           <a:p>
             <a:fld id="{1B7BBFC1-767F-4370-ABF8-558E432A7908}" type="datetimeFigureOut">
               <a:rPr lang="en-US" smtClean="0"/>
-              <a:t>6/18/2025</a:t>
+              <a:t>6/21/2025</a:t>
             </a:fld>
             <a:endParaRPr lang="en-US"/>
           </a:p>
@@ -2385,7 +2386,7 @@
           <a:p>
             <a:fld id="{1B7BBFC1-767F-4370-ABF8-558E432A7908}" type="datetimeFigureOut">
               <a:rPr lang="en-US" smtClean="0"/>
-              <a:t>6/18/2025</a:t>
+              <a:t>6/21/2025</a:t>
             </a:fld>
             <a:endParaRPr lang="en-US"/>
           </a:p>
@@ -2673,7 +2674,7 @@
           <a:p>
             <a:fld id="{1B7BBFC1-767F-4370-ABF8-558E432A7908}" type="datetimeFigureOut">
               <a:rPr lang="en-US" smtClean="0"/>
-              <a:t>6/18/2025</a:t>
+              <a:t>6/21/2025</a:t>
             </a:fld>
             <a:endParaRPr lang="en-US"/>
           </a:p>
@@ -2914,7 +2915,7 @@
           <a:p>
             <a:fld id="{1B7BBFC1-767F-4370-ABF8-558E432A7908}" type="datetimeFigureOut">
               <a:rPr lang="en-US" smtClean="0"/>
-              <a:t>6/18/2025</a:t>
+              <a:t>6/21/2025</a:t>
             </a:fld>
             <a:endParaRPr lang="en-US"/>
           </a:p>
@@ -4594,6 +4595,133 @@
     <p:extLst>
       <p:ext uri="{BB962C8B-B14F-4D97-AF65-F5344CB8AC3E}">
         <p14:creationId xmlns:p14="http://schemas.microsoft.com/office/powerpoint/2010/main" val="4120627777"/>
+      </p:ext>
+    </p:extLst>
+  </p:cSld>
+  <p:clrMapOvr>
+    <a:masterClrMapping/>
+  </p:clrMapOvr>
+</p:sld>
+</file>
+
+<file path=ppt/slides/slide7.xml><?xml version="1.0" encoding="utf-8"?>
+<p:sld xmlns:a="http://schemas.openxmlformats.org/drawingml/2006/main" xmlns:r="http://schemas.openxmlformats.org/officeDocument/2006/relationships" xmlns:p="http://schemas.openxmlformats.org/presentationml/2006/main">
+  <p:cSld>
+    <p:spTree>
+      <p:nvGrpSpPr>
+        <p:cNvPr id="1" name="">
+          <a:extLst>
+            <a:ext uri="{FF2B5EF4-FFF2-40B4-BE49-F238E27FC236}">
+              <a16:creationId xmlns:a16="http://schemas.microsoft.com/office/drawing/2014/main" id="{375E941E-D809-033C-8036-9586E05301C0}"/>
+            </a:ext>
+          </a:extLst>
+        </p:cNvPr>
+        <p:cNvGrpSpPr/>
+        <p:nvPr/>
+      </p:nvGrpSpPr>
+      <p:grpSpPr>
+        <a:xfrm>
+          <a:off x="0" y="0"/>
+          <a:ext cx="0" cy="0"/>
+          <a:chOff x="0" y="0"/>
+          <a:chExt cx="0" cy="0"/>
+        </a:xfrm>
+      </p:grpSpPr>
+      <p:pic>
+        <p:nvPicPr>
+          <p:cNvPr id="5" name="Picture 4" descr="A red circuit board with black and blue components&#10;&#10;AI-generated content may be incorrect.">
+            <a:extLst>
+              <a:ext uri="{FF2B5EF4-FFF2-40B4-BE49-F238E27FC236}">
+                <a16:creationId xmlns:a16="http://schemas.microsoft.com/office/drawing/2014/main" id="{AEACACD7-BC34-6DB4-345D-C269B7A0B00D}"/>
+              </a:ext>
+            </a:extLst>
+          </p:cNvPr>
+          <p:cNvPicPr>
+            <a:picLocks noChangeAspect="1"/>
+          </p:cNvPicPr>
+          <p:nvPr/>
+        </p:nvPicPr>
+        <p:blipFill>
+          <a:blip r:embed="rId2">
+            <a:extLst>
+              <a:ext uri="{28A0092B-C50C-407E-A947-70E740481C1C}">
+                <a14:useLocalDpi xmlns:a14="http://schemas.microsoft.com/office/drawing/2010/main" val="0"/>
+              </a:ext>
+            </a:extLst>
+          </a:blip>
+          <a:stretch>
+            <a:fillRect/>
+          </a:stretch>
+        </p:blipFill>
+        <p:spPr>
+          <a:xfrm>
+            <a:off x="2180040" y="424600"/>
+            <a:ext cx="7577337" cy="5680782"/>
+          </a:xfrm>
+          <a:prstGeom prst="rect">
+            <a:avLst/>
+          </a:prstGeom>
+        </p:spPr>
+      </p:pic>
+      <p:sp>
+        <p:nvSpPr>
+          <p:cNvPr id="6" name="Rectangle: Rounded Corners 5">
+            <a:extLst>
+              <a:ext uri="{FF2B5EF4-FFF2-40B4-BE49-F238E27FC236}">
+                <a16:creationId xmlns:a16="http://schemas.microsoft.com/office/drawing/2014/main" id="{8599518E-28DB-A6B6-8E35-62ACF85A1DE0}"/>
+              </a:ext>
+            </a:extLst>
+          </p:cNvPr>
+          <p:cNvSpPr/>
+          <p:nvPr/>
+        </p:nvSpPr>
+        <p:spPr>
+          <a:xfrm>
+            <a:off x="4679950" y="3044825"/>
+            <a:ext cx="1136649" cy="768350"/>
+          </a:xfrm>
+          <a:prstGeom prst="roundRect">
+            <a:avLst/>
+          </a:prstGeom>
+          <a:noFill/>
+          <a:ln w="38100">
+            <a:solidFill>
+              <a:schemeClr val="accent3">
+                <a:lumMod val="60000"/>
+                <a:lumOff val="40000"/>
+              </a:schemeClr>
+            </a:solidFill>
+          </a:ln>
+        </p:spPr>
+        <p:style>
+          <a:lnRef idx="2">
+            <a:schemeClr val="accent1">
+              <a:shade val="15000"/>
+            </a:schemeClr>
+          </a:lnRef>
+          <a:fillRef idx="1">
+            <a:schemeClr val="accent1"/>
+          </a:fillRef>
+          <a:effectRef idx="0">
+            <a:schemeClr val="accent1"/>
+          </a:effectRef>
+          <a:fontRef idx="minor">
+            <a:schemeClr val="lt1"/>
+          </a:fontRef>
+        </p:style>
+        <p:txBody>
+          <a:bodyPr rtlCol="0" anchor="ctr"/>
+          <a:lstStyle/>
+          <a:p>
+            <a:pPr algn="ctr"/>
+            <a:endParaRPr lang="en-US"/>
+          </a:p>
+        </p:txBody>
+      </p:sp>
+    </p:spTree>
+    <p:extLst>
+      <p:ext uri="{BB962C8B-B14F-4D97-AF65-F5344CB8AC3E}">
+        <p14:creationId xmlns:p14="http://schemas.microsoft.com/office/powerpoint/2010/main" val="1485832419"/>
       </p:ext>
     </p:extLst>
   </p:cSld>

</xml_diff>